<commit_message>
adding TN to figures
</commit_message>
<xml_diff>
--- a/ExportedFigures/Maps.pptx
+++ b/ExportedFigures/Maps.pptx
@@ -7,7 +7,8 @@
   <p:sldIdLst>
     <p:sldId id="256" r:id="rId2"/>
     <p:sldId id="257" r:id="rId3"/>
-    <p:sldId id="258" r:id="rId4"/>
+    <p:sldId id="259" r:id="rId4"/>
+    <p:sldId id="258" r:id="rId5"/>
   </p:sldIdLst>
   <p:sldSz cx="6858000" cy="9144000" type="screen4x3"/>
   <p:notesSz cx="6858000" cy="9144000"/>
@@ -106,6 +107,11 @@
       </a:defRPr>
     </a:lvl9pPr>
   </p:defaultTextStyle>
+  <p:extLst>
+    <p:ext uri="{EFAFB233-063F-42B5-8137-9DF3F51BA10A}">
+      <p15:sldGuideLst xmlns:p15="http://schemas.microsoft.com/office/powerpoint/2012/main"/>
+    </p:ext>
+  </p:extLst>
 </p:presentation>
 </file>
 
@@ -240,7 +246,7 @@
           <a:p>
             <a:fld id="{B2207EB9-21FA-40F4-B810-AFF9C7338314}" type="datetimeFigureOut">
               <a:rPr lang="en-US" smtClean="0"/>
-              <a:t>2/4/2019</a:t>
+              <a:t>2/6/2019</a:t>
             </a:fld>
             <a:endParaRPr lang="en-US"/>
           </a:p>
@@ -410,7 +416,7 @@
           <a:p>
             <a:fld id="{B2207EB9-21FA-40F4-B810-AFF9C7338314}" type="datetimeFigureOut">
               <a:rPr lang="en-US" smtClean="0"/>
-              <a:t>2/4/2019</a:t>
+              <a:t>2/6/2019</a:t>
             </a:fld>
             <a:endParaRPr lang="en-US"/>
           </a:p>
@@ -590,7 +596,7 @@
           <a:p>
             <a:fld id="{B2207EB9-21FA-40F4-B810-AFF9C7338314}" type="datetimeFigureOut">
               <a:rPr lang="en-US" smtClean="0"/>
-              <a:t>2/4/2019</a:t>
+              <a:t>2/6/2019</a:t>
             </a:fld>
             <a:endParaRPr lang="en-US"/>
           </a:p>
@@ -760,7 +766,7 @@
           <a:p>
             <a:fld id="{B2207EB9-21FA-40F4-B810-AFF9C7338314}" type="datetimeFigureOut">
               <a:rPr lang="en-US" smtClean="0"/>
-              <a:t>2/4/2019</a:t>
+              <a:t>2/6/2019</a:t>
             </a:fld>
             <a:endParaRPr lang="en-US"/>
           </a:p>
@@ -1004,7 +1010,7 @@
           <a:p>
             <a:fld id="{B2207EB9-21FA-40F4-B810-AFF9C7338314}" type="datetimeFigureOut">
               <a:rPr lang="en-US" smtClean="0"/>
-              <a:t>2/4/2019</a:t>
+              <a:t>2/6/2019</a:t>
             </a:fld>
             <a:endParaRPr lang="en-US"/>
           </a:p>
@@ -1236,7 +1242,7 @@
           <a:p>
             <a:fld id="{B2207EB9-21FA-40F4-B810-AFF9C7338314}" type="datetimeFigureOut">
               <a:rPr lang="en-US" smtClean="0"/>
-              <a:t>2/4/2019</a:t>
+              <a:t>2/6/2019</a:t>
             </a:fld>
             <a:endParaRPr lang="en-US"/>
           </a:p>
@@ -1603,7 +1609,7 @@
           <a:p>
             <a:fld id="{B2207EB9-21FA-40F4-B810-AFF9C7338314}" type="datetimeFigureOut">
               <a:rPr lang="en-US" smtClean="0"/>
-              <a:t>2/4/2019</a:t>
+              <a:t>2/6/2019</a:t>
             </a:fld>
             <a:endParaRPr lang="en-US"/>
           </a:p>
@@ -1721,7 +1727,7 @@
           <a:p>
             <a:fld id="{B2207EB9-21FA-40F4-B810-AFF9C7338314}" type="datetimeFigureOut">
               <a:rPr lang="en-US" smtClean="0"/>
-              <a:t>2/4/2019</a:t>
+              <a:t>2/6/2019</a:t>
             </a:fld>
             <a:endParaRPr lang="en-US"/>
           </a:p>
@@ -1816,7 +1822,7 @@
           <a:p>
             <a:fld id="{B2207EB9-21FA-40F4-B810-AFF9C7338314}" type="datetimeFigureOut">
               <a:rPr lang="en-US" smtClean="0"/>
-              <a:t>2/4/2019</a:t>
+              <a:t>2/6/2019</a:t>
             </a:fld>
             <a:endParaRPr lang="en-US"/>
           </a:p>
@@ -2093,7 +2099,7 @@
           <a:p>
             <a:fld id="{B2207EB9-21FA-40F4-B810-AFF9C7338314}" type="datetimeFigureOut">
               <a:rPr lang="en-US" smtClean="0"/>
-              <a:t>2/4/2019</a:t>
+              <a:t>2/6/2019</a:t>
             </a:fld>
             <a:endParaRPr lang="en-US"/>
           </a:p>
@@ -2350,7 +2356,7 @@
           <a:p>
             <a:fld id="{B2207EB9-21FA-40F4-B810-AFF9C7338314}" type="datetimeFigureOut">
               <a:rPr lang="en-US" smtClean="0"/>
-              <a:t>2/4/2019</a:t>
+              <a:t>2/6/2019</a:t>
             </a:fld>
             <a:endParaRPr lang="en-US"/>
           </a:p>
@@ -2563,7 +2569,7 @@
           <a:p>
             <a:fld id="{B2207EB9-21FA-40F4-B810-AFF9C7338314}" type="datetimeFigureOut">
               <a:rPr lang="en-US" smtClean="0"/>
-              <a:t>2/4/2019</a:t>
+              <a:t>2/6/2019</a:t>
             </a:fld>
             <a:endParaRPr lang="en-US"/>
           </a:p>
@@ -3234,6 +3240,139 @@
           <a:chExt cx="0" cy="0"/>
         </a:xfrm>
       </p:grpSpPr>
+      <p:sp>
+        <p:nvSpPr>
+          <p:cNvPr id="4" name="TextBox 3"/>
+          <p:cNvSpPr txBox="1"/>
+          <p:nvPr/>
+        </p:nvSpPr>
+        <p:spPr>
+          <a:xfrm>
+            <a:off x="140677" y="150874"/>
+            <a:ext cx="4372708" cy="400110"/>
+          </a:xfrm>
+          <a:prstGeom prst="rect">
+            <a:avLst/>
+          </a:prstGeom>
+          <a:noFill/>
+        </p:spPr>
+        <p:txBody>
+          <a:bodyPr wrap="square" rtlCol="0">
+            <a:spAutoFit/>
+          </a:bodyPr>
+          <a:lstStyle/>
+          <a:p>
+            <a:r>
+              <a:rPr lang="en-US" sz="2000" b="1" dirty="0" smtClean="0">
+                <a:latin typeface="Arial" panose="020B0604020202020204" pitchFamily="34" charset="0"/>
+                <a:cs typeface="Arial" panose="020B0604020202020204" pitchFamily="34" charset="0"/>
+              </a:rPr>
+              <a:t>Nutrients (total </a:t>
+            </a:r>
+            <a:r>
+              <a:rPr lang="en-US" sz="2000" b="1" dirty="0" smtClean="0">
+                <a:latin typeface="Arial" panose="020B0604020202020204" pitchFamily="34" charset="0"/>
+                <a:cs typeface="Arial" panose="020B0604020202020204" pitchFamily="34" charset="0"/>
+              </a:rPr>
+              <a:t>nitrogen)</a:t>
+            </a:r>
+            <a:endParaRPr lang="en-US" sz="2000" b="1" dirty="0">
+              <a:latin typeface="Arial" panose="020B0604020202020204" pitchFamily="34" charset="0"/>
+              <a:cs typeface="Arial" panose="020B0604020202020204" pitchFamily="34" charset="0"/>
+            </a:endParaRPr>
+          </a:p>
+        </p:txBody>
+      </p:sp>
+      <p:pic>
+        <p:nvPicPr>
+          <p:cNvPr id="6" name="Picture 5"/>
+          <p:cNvPicPr>
+            <a:picLocks noChangeAspect="1"/>
+          </p:cNvPicPr>
+          <p:nvPr/>
+        </p:nvPicPr>
+        <p:blipFill>
+          <a:blip r:embed="rId2" cstate="print">
+            <a:extLst>
+              <a:ext uri="{28A0092B-C50C-407E-A947-70E740481C1C}">
+                <a14:useLocalDpi xmlns:a14="http://schemas.microsoft.com/office/drawing/2010/main" val="0"/>
+              </a:ext>
+            </a:extLst>
+          </a:blip>
+          <a:stretch>
+            <a:fillRect/>
+          </a:stretch>
+        </p:blipFill>
+        <p:spPr>
+          <a:xfrm>
+            <a:off x="658368" y="4407408"/>
+            <a:ext cx="5325035" cy="4114800"/>
+          </a:xfrm>
+          <a:prstGeom prst="rect">
+            <a:avLst/>
+          </a:prstGeom>
+        </p:spPr>
+      </p:pic>
+      <p:pic>
+        <p:nvPicPr>
+          <p:cNvPr id="7" name="Picture 6"/>
+          <p:cNvPicPr>
+            <a:picLocks noChangeAspect="1"/>
+          </p:cNvPicPr>
+          <p:nvPr/>
+        </p:nvPicPr>
+        <p:blipFill>
+          <a:blip r:embed="rId3" cstate="print">
+            <a:extLst>
+              <a:ext uri="{28A0092B-C50C-407E-A947-70E740481C1C}">
+                <a14:useLocalDpi xmlns:a14="http://schemas.microsoft.com/office/drawing/2010/main" val="0"/>
+              </a:ext>
+            </a:extLst>
+          </a:blip>
+          <a:stretch>
+            <a:fillRect/>
+          </a:stretch>
+        </p:blipFill>
+        <p:spPr>
+          <a:xfrm>
+            <a:off x="658368" y="484632"/>
+            <a:ext cx="5325035" cy="4114800"/>
+          </a:xfrm>
+          <a:prstGeom prst="rect">
+            <a:avLst/>
+          </a:prstGeom>
+        </p:spPr>
+      </p:pic>
+    </p:spTree>
+    <p:extLst>
+      <p:ext uri="{BB962C8B-B14F-4D97-AF65-F5344CB8AC3E}">
+        <p14:creationId xmlns:p14="http://schemas.microsoft.com/office/powerpoint/2010/main" val="3305669525"/>
+      </p:ext>
+    </p:extLst>
+  </p:cSld>
+  <p:clrMapOvr>
+    <a:masterClrMapping/>
+  </p:clrMapOvr>
+</p:sld>
+</file>
+
+<file path=ppt/slides/slide4.xml><?xml version="1.0" encoding="utf-8"?>
+<p:sld xmlns:a="http://schemas.openxmlformats.org/drawingml/2006/main" xmlns:r="http://schemas.openxmlformats.org/officeDocument/2006/relationships" xmlns:p="http://schemas.openxmlformats.org/presentationml/2006/main">
+  <p:cSld>
+    <p:spTree>
+      <p:nvGrpSpPr>
+        <p:cNvPr id="1" name=""/>
+        <p:cNvGrpSpPr/>
+        <p:nvPr/>
+      </p:nvGrpSpPr>
+      <p:grpSpPr>
+        <a:xfrm>
+          <a:off x="0" y="0"/>
+          <a:ext cx="0" cy="0"/>
+          <a:chOff x="0" y="0"/>
+          <a:chExt cx="0" cy="0"/>
+        </a:xfrm>
+      </p:grpSpPr>
       <p:pic>
         <p:nvPicPr>
           <p:cNvPr id="4" name="Picture 3"/>

</xml_diff>

<commit_message>
update algae to algal
</commit_message>
<xml_diff>
--- a/ExportedFigures/Maps.pptx
+++ b/ExportedFigures/Maps.pptx
@@ -246,7 +246,7 @@
           <a:p>
             <a:fld id="{B2207EB9-21FA-40F4-B810-AFF9C7338314}" type="datetimeFigureOut">
               <a:rPr lang="en-US" smtClean="0"/>
-              <a:t>2/6/2019</a:t>
+              <a:t>2/19/2019</a:t>
             </a:fld>
             <a:endParaRPr lang="en-US"/>
           </a:p>
@@ -416,7 +416,7 @@
           <a:p>
             <a:fld id="{B2207EB9-21FA-40F4-B810-AFF9C7338314}" type="datetimeFigureOut">
               <a:rPr lang="en-US" smtClean="0"/>
-              <a:t>2/6/2019</a:t>
+              <a:t>2/19/2019</a:t>
             </a:fld>
             <a:endParaRPr lang="en-US"/>
           </a:p>
@@ -596,7 +596,7 @@
           <a:p>
             <a:fld id="{B2207EB9-21FA-40F4-B810-AFF9C7338314}" type="datetimeFigureOut">
               <a:rPr lang="en-US" smtClean="0"/>
-              <a:t>2/6/2019</a:t>
+              <a:t>2/19/2019</a:t>
             </a:fld>
             <a:endParaRPr lang="en-US"/>
           </a:p>
@@ -766,7 +766,7 @@
           <a:p>
             <a:fld id="{B2207EB9-21FA-40F4-B810-AFF9C7338314}" type="datetimeFigureOut">
               <a:rPr lang="en-US" smtClean="0"/>
-              <a:t>2/6/2019</a:t>
+              <a:t>2/19/2019</a:t>
             </a:fld>
             <a:endParaRPr lang="en-US"/>
           </a:p>
@@ -1010,7 +1010,7 @@
           <a:p>
             <a:fld id="{B2207EB9-21FA-40F4-B810-AFF9C7338314}" type="datetimeFigureOut">
               <a:rPr lang="en-US" smtClean="0"/>
-              <a:t>2/6/2019</a:t>
+              <a:t>2/19/2019</a:t>
             </a:fld>
             <a:endParaRPr lang="en-US"/>
           </a:p>
@@ -1242,7 +1242,7 @@
           <a:p>
             <a:fld id="{B2207EB9-21FA-40F4-B810-AFF9C7338314}" type="datetimeFigureOut">
               <a:rPr lang="en-US" smtClean="0"/>
-              <a:t>2/6/2019</a:t>
+              <a:t>2/19/2019</a:t>
             </a:fld>
             <a:endParaRPr lang="en-US"/>
           </a:p>
@@ -1609,7 +1609,7 @@
           <a:p>
             <a:fld id="{B2207EB9-21FA-40F4-B810-AFF9C7338314}" type="datetimeFigureOut">
               <a:rPr lang="en-US" smtClean="0"/>
-              <a:t>2/6/2019</a:t>
+              <a:t>2/19/2019</a:t>
             </a:fld>
             <a:endParaRPr lang="en-US"/>
           </a:p>
@@ -1727,7 +1727,7 @@
           <a:p>
             <a:fld id="{B2207EB9-21FA-40F4-B810-AFF9C7338314}" type="datetimeFigureOut">
               <a:rPr lang="en-US" smtClean="0"/>
-              <a:t>2/6/2019</a:t>
+              <a:t>2/19/2019</a:t>
             </a:fld>
             <a:endParaRPr lang="en-US"/>
           </a:p>
@@ -1822,7 +1822,7 @@
           <a:p>
             <a:fld id="{B2207EB9-21FA-40F4-B810-AFF9C7338314}" type="datetimeFigureOut">
               <a:rPr lang="en-US" smtClean="0"/>
-              <a:t>2/6/2019</a:t>
+              <a:t>2/19/2019</a:t>
             </a:fld>
             <a:endParaRPr lang="en-US"/>
           </a:p>
@@ -2099,7 +2099,7 @@
           <a:p>
             <a:fld id="{B2207EB9-21FA-40F4-B810-AFF9C7338314}" type="datetimeFigureOut">
               <a:rPr lang="en-US" smtClean="0"/>
-              <a:t>2/6/2019</a:t>
+              <a:t>2/19/2019</a:t>
             </a:fld>
             <a:endParaRPr lang="en-US"/>
           </a:p>
@@ -2356,7 +2356,7 @@
           <a:p>
             <a:fld id="{B2207EB9-21FA-40F4-B810-AFF9C7338314}" type="datetimeFigureOut">
               <a:rPr lang="en-US" smtClean="0"/>
-              <a:t>2/6/2019</a:t>
+              <a:t>2/19/2019</a:t>
             </a:fld>
             <a:endParaRPr lang="en-US"/>
           </a:p>
@@ -2569,7 +2569,7 @@
           <a:p>
             <a:fld id="{B2207EB9-21FA-40F4-B810-AFF9C7338314}" type="datetimeFigureOut">
               <a:rPr lang="en-US" smtClean="0"/>
-              <a:t>2/6/2019</a:t>
+              <a:t>2/19/2019</a:t>
             </a:fld>
             <a:endParaRPr lang="en-US"/>
           </a:p>
@@ -3267,14 +3267,7 @@
                 <a:latin typeface="Arial" panose="020B0604020202020204" pitchFamily="34" charset="0"/>
                 <a:cs typeface="Arial" panose="020B0604020202020204" pitchFamily="34" charset="0"/>
               </a:rPr>
-              <a:t>Nutrients (total </a:t>
-            </a:r>
-            <a:r>
-              <a:rPr lang="en-US" sz="2000" b="1" dirty="0" smtClean="0">
-                <a:latin typeface="Arial" panose="020B0604020202020204" pitchFamily="34" charset="0"/>
-                <a:cs typeface="Arial" panose="020B0604020202020204" pitchFamily="34" charset="0"/>
-              </a:rPr>
-              <a:t>nitrogen)</a:t>
+              <a:t>Nutrients (total nitrogen)</a:t>
             </a:r>
             <a:endParaRPr lang="en-US" sz="2000" b="1" dirty="0">
               <a:latin typeface="Arial" panose="020B0604020202020204" pitchFamily="34" charset="0"/>
@@ -3460,7 +3453,14 @@
                 <a:latin typeface="Arial" panose="020B0604020202020204" pitchFamily="34" charset="0"/>
                 <a:cs typeface="Arial" panose="020B0604020202020204" pitchFamily="34" charset="0"/>
               </a:rPr>
-              <a:t>Algae biomass (chlorophyll-a)</a:t>
+              <a:t>Algal </a:t>
+            </a:r>
+            <a:r>
+              <a:rPr lang="en-US" sz="2000" b="1" dirty="0" smtClean="0">
+                <a:latin typeface="Arial" panose="020B0604020202020204" pitchFamily="34" charset="0"/>
+                <a:cs typeface="Arial" panose="020B0604020202020204" pitchFamily="34" charset="0"/>
+              </a:rPr>
+              <a:t>biomass (chlorophyll-a)</a:t>
             </a:r>
             <a:endParaRPr lang="en-US" sz="2000" b="1" dirty="0">
               <a:latin typeface="Arial" panose="020B0604020202020204" pitchFamily="34" charset="0"/>

</xml_diff>